<commit_message>
combined sections into segments
</commit_message>
<xml_diff>
--- a/S1.4_mdBook.pptx
+++ b/S1.4_mdBook.pptx
@@ -8523,6 +8523,10 @@
           <a:bodyPr/>
           <a:lstStyle/>
           <a:p>
+            <a:r>
+              <a:rPr lang="en-US" smtClean="0"/>
+              <a:t>mdBook</a:t>
+            </a:r>
             <a:endParaRPr lang="en-US"/>
           </a:p>
         </p:txBody>
@@ -8578,6 +8582,13 @@
   <p:clrMapOvr>
     <a:masterClrMapping/>
   </p:clrMapOvr>
+  <p:timing>
+    <p:tnLst>
+      <p:par>
+        <p:cTn id="1" dur="indefinite" restart="never" nodeType="tmRoot"/>
+      </p:par>
+    </p:tnLst>
+  </p:timing>
 </p:sld>
 </file>
 

</xml_diff>